<commit_message>
Corrected typo in presentation
</commit_message>
<xml_diff>
--- a/GOOS Presentation.pptx
+++ b/GOOS Presentation.pptx
@@ -3345,15 +3345,7 @@
           <a:p>
             <a:r>
               <a:rPr lang="en-US" sz="2400" dirty="0" smtClean="0"/>
-              <a:t>GOOS </a:t>
-            </a:r>
-            <a:r>
-              <a:rPr lang="en-US" sz="2400" dirty="0" smtClean="0"/>
-              <a:t>code examples </a:t>
-            </a:r>
-            <a:r>
-              <a:rPr lang="en-US" sz="2400" dirty="0" smtClean="0"/>
-              <a:t>from author</a:t>
+              <a:t>GOOS code examples from author</a:t>
             </a:r>
             <a:r>
               <a:rPr lang="en-US" sz="2400" dirty="0"/>
@@ -4200,11 +4192,7 @@
             </a:r>
             <a:r>
               <a:rPr lang="en-US" sz="2400" dirty="0" smtClean="0"/>
-              <a:t> Twitter) </a:t>
-            </a:r>
-            <a:r>
-              <a:rPr lang="en-US" sz="2400" dirty="0" smtClean="0"/>
-              <a:t>is a wonderful intermediate TDD book</a:t>
+              <a:t> Twitter) is a wonderful intermediate TDD book</a:t>
             </a:r>
           </a:p>
           <a:p>
@@ -4621,15 +4609,7 @@
           <a:p>
             <a:r>
               <a:rPr lang="en-US" sz="2400" dirty="0" smtClean="0"/>
-              <a:t>Matches many principles used in </a:t>
-            </a:r>
-            <a:r>
-              <a:rPr lang="en-US" sz="2400" dirty="0" smtClean="0"/>
-              <a:t>ThoughtWorks </a:t>
-            </a:r>
-            <a:r>
-              <a:rPr lang="en-US" sz="2400" dirty="0" smtClean="0"/>
-              <a:t>development</a:t>
+              <a:t>Matches many principles used in ThoughtWorks development</a:t>
             </a:r>
           </a:p>
           <a:p>
@@ -5001,27 +4981,14 @@
           <a:p>
             <a:r>
               <a:rPr lang="en-US" sz="2400" dirty="0" smtClean="0"/>
-              <a:t>GOOS is </a:t>
-            </a:r>
+              <a:t>GOOS is not a TDD introductory book</a:t>
+            </a:r>
+          </a:p>
+          <a:p>
             <a:r>
               <a:rPr lang="en-US" sz="2400" dirty="0" smtClean="0"/>
-              <a:t>not a TDD introductory book</a:t>
-            </a:r>
-          </a:p>
-          <a:p>
-            <a:r>
-              <a:rPr lang="en-US" sz="2400" dirty="0" smtClean="0"/>
-              <a:t>GOOS is </a:t>
-            </a:r>
-            <a:r>
-              <a:rPr lang="en-US" sz="2400" dirty="0" smtClean="0"/>
-              <a:t>not for people who don’t know </a:t>
-            </a:r>
-            <a:r>
-              <a:rPr lang="en-US" sz="2400" dirty="0" smtClean="0"/>
-              <a:t>any Java</a:t>
-            </a:r>
-            <a:endParaRPr lang="en-US" sz="2400" dirty="0" smtClean="0"/>
+              <a:t>GOOS is not for people who don’t know any Java</a:t>
+            </a:r>
           </a:p>
           <a:p>
             <a:r>
@@ -5032,43 +4999,19 @@
           <a:p>
             <a:r>
               <a:rPr lang="en-US" sz="2400" dirty="0" smtClean="0"/>
-              <a:t>GOOS</a:t>
-            </a:r>
+              <a:t>GOOS is a book on mock objects</a:t>
+            </a:r>
+          </a:p>
+          <a:p>
             <a:r>
               <a:rPr lang="en-US" sz="2400" dirty="0" smtClean="0"/>
-              <a:t> </a:t>
-            </a:r>
+              <a:t>GOOS is a book for learning OO design principles</a:t>
+            </a:r>
+          </a:p>
+          <a:p>
             <a:r>
               <a:rPr lang="en-US" sz="2400" dirty="0" smtClean="0"/>
-              <a:t>is a book on mock objects</a:t>
-            </a:r>
-          </a:p>
-          <a:p>
-            <a:r>
-              <a:rPr lang="en-US" sz="2400" dirty="0" smtClean="0"/>
-              <a:t>GOOS</a:t>
-            </a:r>
-            <a:r>
-              <a:rPr lang="en-US" sz="2400" dirty="0" smtClean="0"/>
-              <a:t> </a:t>
-            </a:r>
-            <a:r>
-              <a:rPr lang="en-US" sz="2400" dirty="0" smtClean="0"/>
-              <a:t>is a book for learning OO design principles</a:t>
-            </a:r>
-          </a:p>
-          <a:p>
-            <a:r>
-              <a:rPr lang="en-US" sz="2400" dirty="0" smtClean="0"/>
-              <a:t>GOOS</a:t>
-            </a:r>
-            <a:r>
-              <a:rPr lang="en-US" sz="2400" dirty="0" smtClean="0"/>
-              <a:t> </a:t>
-            </a:r>
-            <a:r>
-              <a:rPr lang="en-US" sz="2400" dirty="0" smtClean="0"/>
-              <a:t>is a book for improving your Java with testing libraries</a:t>
+              <a:t>GOOS is a book for improving your Java with testing libraries</a:t>
             </a:r>
             <a:endParaRPr lang="en-US" sz="2400" dirty="0"/>
           </a:p>
@@ -5606,7 +5549,35 @@
           <a:p>
             <a:r>
               <a:rPr lang="en-US" sz="2400" dirty="0" smtClean="0"/>
-              <a:t>Mocks used to drive out new classes uses interfaces as relationships between classes</a:t>
+              <a:t>Mocks used to drive out new </a:t>
+            </a:r>
+            <a:r>
+              <a:rPr lang="en-US" sz="2400" smtClean="0"/>
+              <a:t>classes </a:t>
+            </a:r>
+            <a:r>
+              <a:rPr lang="en-US" sz="2400" smtClean="0"/>
+              <a:t>by </a:t>
+            </a:r>
+            <a:r>
+              <a:rPr lang="en-US" sz="2400" smtClean="0"/>
+              <a:t>using </a:t>
+            </a:r>
+            <a:r>
+              <a:rPr lang="en-US" sz="2400" dirty="0" smtClean="0"/>
+              <a:t>interfaces </a:t>
+            </a:r>
+            <a:r>
+              <a:rPr lang="en-US" sz="2400" dirty="0" smtClean="0"/>
+              <a:t>for </a:t>
+            </a:r>
+            <a:r>
+              <a:rPr lang="en-US" sz="2400" dirty="0" smtClean="0"/>
+              <a:t>relationships </a:t>
+            </a:r>
+            <a:r>
+              <a:rPr lang="en-US" sz="2400" dirty="0" smtClean="0"/>
+              <a:t>between classes</a:t>
             </a:r>
           </a:p>
           <a:p>
@@ -6013,15 +5984,7 @@
           <a:p>
             <a:r>
               <a:rPr lang="en-US" sz="2400" dirty="0" smtClean="0"/>
-              <a:t>First story in greenfield project </a:t>
-            </a:r>
-            <a:r>
-              <a:rPr lang="en-US" sz="2400" dirty="0" smtClean="0"/>
-              <a:t>should produce </a:t>
-            </a:r>
-            <a:r>
-              <a:rPr lang="en-US" sz="2400" dirty="0" smtClean="0"/>
-              <a:t>a “walking skeleton” of the application</a:t>
+              <a:t>First story in greenfield project should produce a “walking skeleton” of the application</a:t>
             </a:r>
           </a:p>
           <a:p>
@@ -6057,11 +6020,7 @@
           <a:p>
             <a:r>
               <a:rPr lang="en-US" sz="2400" dirty="0" smtClean="0"/>
-              <a:t>Fits well with </a:t>
-            </a:r>
-            <a:r>
-              <a:rPr lang="en-US" sz="2400" dirty="0" smtClean="0"/>
-              <a:t>Continuous </a:t>
+              <a:t>Fits well with Continuous </a:t>
             </a:r>
             <a:r>
               <a:rPr lang="en-US" sz="2400" dirty="0"/>
@@ -6069,11 +6028,7 @@
             </a:r>
             <a:r>
               <a:rPr lang="en-US" sz="2400" dirty="0" smtClean="0"/>
-              <a:t>elivery </a:t>
-            </a:r>
-            <a:r>
-              <a:rPr lang="en-US" sz="2400" dirty="0" smtClean="0"/>
-              <a:t>ideas of tested deployments</a:t>
+              <a:t>elivery ideas of tested deployments</a:t>
             </a:r>
             <a:endParaRPr lang="en-US" sz="2400" dirty="0"/>
           </a:p>

</xml_diff>